<commit_message>
Estimators and Estimated and Confidence Intervals notes added
</commit_message>
<xml_diff>
--- a/Stats/010_Hypothesis-Testing/Hypothesis.pptx
+++ b/Stats/010_Hypothesis-Testing/Hypothesis.pptx
@@ -1541,6 +1541,13 @@
         </dgm:presLayoutVars>
       </dgm:prSet>
       <dgm:spPr/>
+      <dgm:t>
+        <a:bodyPr/>
+        <a:lstStyle/>
+        <a:p>
+          <a:endParaRPr lang="en-US"/>
+        </a:p>
+      </dgm:t>
     </dgm:pt>
     <dgm:pt modelId="{EEA0BE2B-D300-45B3-B4A8-BA53299D4183}" type="pres">
       <dgm:prSet presAssocID="{68D38548-0C6D-4FC1-9BB9-DE83060CBA78}" presName="vertOne" presStyleCnt="0"/>
@@ -1553,6 +1560,13 @@
         </dgm:presLayoutVars>
       </dgm:prSet>
       <dgm:spPr/>
+      <dgm:t>
+        <a:bodyPr/>
+        <a:lstStyle/>
+        <a:p>
+          <a:endParaRPr lang="en-US"/>
+        </a:p>
+      </dgm:t>
     </dgm:pt>
     <dgm:pt modelId="{7322D62B-E4AA-4FEE-B87A-A76B91A0B46D}" type="pres">
       <dgm:prSet presAssocID="{68D38548-0C6D-4FC1-9BB9-DE83060CBA78}" presName="parTransOne" presStyleCnt="0"/>
@@ -1573,6 +1587,13 @@
         </dgm:presLayoutVars>
       </dgm:prSet>
       <dgm:spPr/>
+      <dgm:t>
+        <a:bodyPr/>
+        <a:lstStyle/>
+        <a:p>
+          <a:endParaRPr lang="en-US"/>
+        </a:p>
+      </dgm:t>
     </dgm:pt>
     <dgm:pt modelId="{45944C63-F638-4585-9399-5B94A09EEC9C}" type="pres">
       <dgm:prSet presAssocID="{F6B61789-A162-4F46-AF7A-47222B3A3083}" presName="parTransTwo" presStyleCnt="0"/>
@@ -1647,6 +1668,13 @@
         </dgm:presLayoutVars>
       </dgm:prSet>
       <dgm:spPr/>
+      <dgm:t>
+        <a:bodyPr/>
+        <a:lstStyle/>
+        <a:p>
+          <a:endParaRPr lang="en-US"/>
+        </a:p>
+      </dgm:t>
     </dgm:pt>
     <dgm:pt modelId="{47D75B29-A241-4A21-B3FF-14E8083F60D3}" type="pres">
       <dgm:prSet presAssocID="{C8D12747-CD76-4D8A-A13C-336EBC174984}" presName="parTransTwo" presStyleCnt="0"/>
@@ -1667,6 +1695,13 @@
         </dgm:presLayoutVars>
       </dgm:prSet>
       <dgm:spPr/>
+      <dgm:t>
+        <a:bodyPr/>
+        <a:lstStyle/>
+        <a:p>
+          <a:endParaRPr lang="en-US"/>
+        </a:p>
+      </dgm:t>
     </dgm:pt>
     <dgm:pt modelId="{F27AE593-5C5F-42A3-B6BE-4A9A45E03FFD}" type="pres">
       <dgm:prSet presAssocID="{9BF4B013-4B03-4671-8444-B72B5EC5BC8B}" presName="horzThree" presStyleCnt="0"/>
@@ -1687,6 +1722,13 @@
         </dgm:presLayoutVars>
       </dgm:prSet>
       <dgm:spPr/>
+      <dgm:t>
+        <a:bodyPr/>
+        <a:lstStyle/>
+        <a:p>
+          <a:endParaRPr lang="en-US"/>
+        </a:p>
+      </dgm:t>
     </dgm:pt>
     <dgm:pt modelId="{A08A53CC-1753-4265-9729-DE40E32052FB}" type="pres">
       <dgm:prSet presAssocID="{31E84CBF-691E-49FA-AE0B-1712A8291958}" presName="horzThree" presStyleCnt="0"/>
@@ -1707,6 +1749,13 @@
         </dgm:presLayoutVars>
       </dgm:prSet>
       <dgm:spPr/>
+      <dgm:t>
+        <a:bodyPr/>
+        <a:lstStyle/>
+        <a:p>
+          <a:endParaRPr lang="en-US"/>
+        </a:p>
+      </dgm:t>
     </dgm:pt>
     <dgm:pt modelId="{D7EBAB7F-547B-4904-AA1A-A452EEF9718C}" type="pres">
       <dgm:prSet presAssocID="{690DA841-FBA0-43DA-BB36-61D80EBE630E}" presName="horzThree" presStyleCnt="0"/>
@@ -1727,6 +1776,13 @@
         </dgm:presLayoutVars>
       </dgm:prSet>
       <dgm:spPr/>
+      <dgm:t>
+        <a:bodyPr/>
+        <a:lstStyle/>
+        <a:p>
+          <a:endParaRPr lang="en-US"/>
+        </a:p>
+      </dgm:t>
     </dgm:pt>
     <dgm:pt modelId="{992A2E0F-538E-4B46-8B4E-3F0FD3E0B83B}" type="pres">
       <dgm:prSet presAssocID="{857F27A3-CD67-4C5D-B7BD-D66E5BE15C86}" presName="horzThree" presStyleCnt="0"/>
@@ -1734,25 +1790,25 @@
     </dgm:pt>
   </dgm:ptLst>
   <dgm:cxnLst>
-    <dgm:cxn modelId="{649174C8-2526-4F1B-99A9-9074BA8DDA1C}" type="presOf" srcId="{F6B61789-A162-4F46-AF7A-47222B3A3083}" destId="{F4F797F7-0648-469A-85FC-CF81582105D5}" srcOrd="0" destOrd="0" presId="urn:microsoft.com/office/officeart/2005/8/layout/hierarchy4"/>
+    <dgm:cxn modelId="{72AF1918-6D61-4E5C-A64C-BE575DEB7982}" type="presOf" srcId="{68D38548-0C6D-4FC1-9BB9-DE83060CBA78}" destId="{F42F8C64-EB35-4374-8818-6CF1B32BDC7F}" srcOrd="0" destOrd="0" presId="urn:microsoft.com/office/officeart/2005/8/layout/hierarchy4"/>
+    <dgm:cxn modelId="{C93A21F4-3F9B-4B6A-BAC5-C248D0D34A7C}" srcId="{F6B61789-A162-4F46-AF7A-47222B3A3083}" destId="{65E67802-EB69-4DC3-9275-554C45FEF76F}" srcOrd="1" destOrd="0" parTransId="{AE65A81F-6411-4495-B7B7-1CFC767ECCAA}" sibTransId="{CCC67142-FF72-41C6-8FAA-CE2A583762EB}"/>
+    <dgm:cxn modelId="{9D5CDD4D-166E-461D-AB2C-CED63B69F234}" srcId="{C717C844-0A64-4C27-84CD-798B63D6257B}" destId="{68D38548-0C6D-4FC1-9BB9-DE83060CBA78}" srcOrd="0" destOrd="0" parTransId="{BB63F601-7ABC-4D88-BFD7-D98F189946EC}" sibTransId="{9767488C-C57B-45E7-A743-F351326F4032}"/>
+    <dgm:cxn modelId="{D6522A64-0156-4CDE-93A0-6E6B075022FB}" type="presOf" srcId="{31E84CBF-691E-49FA-AE0B-1712A8291958}" destId="{5BC74C94-25DA-4E94-8247-A9C9B933A2FA}" srcOrd="0" destOrd="0" presId="urn:microsoft.com/office/officeart/2005/8/layout/hierarchy4"/>
+    <dgm:cxn modelId="{223AFC14-B66E-4849-B5A0-A1A5567E2EF8}" type="presOf" srcId="{9BF4B013-4B03-4671-8444-B72B5EC5BC8B}" destId="{C56F96B9-E17F-4B96-A66C-7136898F5F56}" srcOrd="0" destOrd="0" presId="urn:microsoft.com/office/officeart/2005/8/layout/hierarchy4"/>
+    <dgm:cxn modelId="{B5BDC00A-093B-4A85-A75D-5E0F2C0A0CEC}" srcId="{C8D12747-CD76-4D8A-A13C-336EBC174984}" destId="{31E84CBF-691E-49FA-AE0B-1712A8291958}" srcOrd="1" destOrd="0" parTransId="{AAEA2B16-94C1-4B9A-83D4-BFE34D0DF08C}" sibTransId="{0170B4C2-1A0F-41DA-A1D1-A4D73CE71B37}"/>
+    <dgm:cxn modelId="{97EA53C6-6B4C-4435-B585-5DD3787C9D10}" type="presOf" srcId="{C717C844-0A64-4C27-84CD-798B63D6257B}" destId="{9273C5CD-C4A5-40C2-9F7E-F5C4BD228646}" srcOrd="0" destOrd="0" presId="urn:microsoft.com/office/officeart/2005/8/layout/hierarchy4"/>
+    <dgm:cxn modelId="{1085FBC0-3C69-444D-B6EE-79DB376AB673}" type="presOf" srcId="{690DA841-FBA0-43DA-BB36-61D80EBE630E}" destId="{27E010F0-93CD-40D9-9AC6-8CE3FA3CD7E1}" srcOrd="0" destOrd="0" presId="urn:microsoft.com/office/officeart/2005/8/layout/hierarchy4"/>
+    <dgm:cxn modelId="{DBB0F7B2-AD09-4CFB-8A02-CDD2BECBE23F}" srcId="{C8D12747-CD76-4D8A-A13C-336EBC174984}" destId="{690DA841-FBA0-43DA-BB36-61D80EBE630E}" srcOrd="2" destOrd="0" parTransId="{9A77E04C-878C-4948-A83A-06F447F1927B}" sibTransId="{A25E8313-7E98-407A-B752-B47AD14ECEB4}"/>
+    <dgm:cxn modelId="{AECAC909-C9E1-44E3-A6EC-3A88D10F9FD7}" type="presOf" srcId="{DC018D43-4F56-43C6-A138-74064592FBA5}" destId="{D03E131C-D55A-4FA6-856E-6DB764710BD6}" srcOrd="0" destOrd="0" presId="urn:microsoft.com/office/officeart/2005/8/layout/hierarchy4"/>
+    <dgm:cxn modelId="{5ECF2D7F-38AE-4A11-BF8E-8FA101F12A66}" srcId="{68D38548-0C6D-4FC1-9BB9-DE83060CBA78}" destId="{C8D12747-CD76-4D8A-A13C-336EBC174984}" srcOrd="1" destOrd="0" parTransId="{C8F4732A-B1A2-44CF-B0F2-CED3679438E0}" sibTransId="{F1BA292A-D898-4712-8741-3729222F5790}"/>
+    <dgm:cxn modelId="{1A29C05F-766A-4192-8C6B-6845F98B7193}" srcId="{C8D12747-CD76-4D8A-A13C-336EBC174984}" destId="{9BF4B013-4B03-4671-8444-B72B5EC5BC8B}" srcOrd="0" destOrd="0" parTransId="{3514E9FC-8505-4E1D-9C66-F627882849E6}" sibTransId="{F1282BCA-A7F7-4107-8385-061370B3DD81}"/>
     <dgm:cxn modelId="{7E3C4B36-C76A-43B9-B6A1-DFB95B0C4B53}" srcId="{68D38548-0C6D-4FC1-9BB9-DE83060CBA78}" destId="{F6B61789-A162-4F46-AF7A-47222B3A3083}" srcOrd="0" destOrd="0" parTransId="{C1A861B9-3892-4374-8437-D3188BEF6E9F}" sibTransId="{63364D80-ADF9-474B-9B8E-167B2F4EECEE}"/>
-    <dgm:cxn modelId="{1085FBC0-3C69-444D-B6EE-79DB376AB673}" type="presOf" srcId="{690DA841-FBA0-43DA-BB36-61D80EBE630E}" destId="{27E010F0-93CD-40D9-9AC6-8CE3FA3CD7E1}" srcOrd="0" destOrd="0" presId="urn:microsoft.com/office/officeart/2005/8/layout/hierarchy4"/>
-    <dgm:cxn modelId="{223AFC14-B66E-4849-B5A0-A1A5567E2EF8}" type="presOf" srcId="{9BF4B013-4B03-4671-8444-B72B5EC5BC8B}" destId="{C56F96B9-E17F-4B96-A66C-7136898F5F56}" srcOrd="0" destOrd="0" presId="urn:microsoft.com/office/officeart/2005/8/layout/hierarchy4"/>
-    <dgm:cxn modelId="{AECAC909-C9E1-44E3-A6EC-3A88D10F9FD7}" type="presOf" srcId="{DC018D43-4F56-43C6-A138-74064592FBA5}" destId="{D03E131C-D55A-4FA6-856E-6DB764710BD6}" srcOrd="0" destOrd="0" presId="urn:microsoft.com/office/officeart/2005/8/layout/hierarchy4"/>
-    <dgm:cxn modelId="{D6522A64-0156-4CDE-93A0-6E6B075022FB}" type="presOf" srcId="{31E84CBF-691E-49FA-AE0B-1712A8291958}" destId="{5BC74C94-25DA-4E94-8247-A9C9B933A2FA}" srcOrd="0" destOrd="0" presId="urn:microsoft.com/office/officeart/2005/8/layout/hierarchy4"/>
-    <dgm:cxn modelId="{97EA53C6-6B4C-4435-B585-5DD3787C9D10}" type="presOf" srcId="{C717C844-0A64-4C27-84CD-798B63D6257B}" destId="{9273C5CD-C4A5-40C2-9F7E-F5C4BD228646}" srcOrd="0" destOrd="0" presId="urn:microsoft.com/office/officeart/2005/8/layout/hierarchy4"/>
+    <dgm:cxn modelId="{FFC4B993-7072-4D0B-AECF-414981AA16BF}" srcId="{C8D12747-CD76-4D8A-A13C-336EBC174984}" destId="{857F27A3-CD67-4C5D-B7BD-D66E5BE15C86}" srcOrd="3" destOrd="0" parTransId="{DAAEA5EC-19AA-4D15-B1B5-4276EBEE89B0}" sibTransId="{3923C1F4-0671-4D20-B97C-7F1B9A57D278}"/>
     <dgm:cxn modelId="{B01E67ED-B40D-4521-9CEA-184975191D93}" srcId="{F6B61789-A162-4F46-AF7A-47222B3A3083}" destId="{DC018D43-4F56-43C6-A138-74064592FBA5}" srcOrd="0" destOrd="0" parTransId="{454DA42F-B41C-4ECD-8D5F-5585676FF213}" sibTransId="{22D531AE-BB62-4535-8200-1F91E9C7AB1A}"/>
     <dgm:cxn modelId="{4E6D60EA-FCA3-4E17-9C1C-37129037AABC}" type="presOf" srcId="{C8D12747-CD76-4D8A-A13C-336EBC174984}" destId="{F2802BE8-A8C5-4E58-BEAE-733CA94ACCCF}" srcOrd="0" destOrd="0" presId="urn:microsoft.com/office/officeart/2005/8/layout/hierarchy4"/>
-    <dgm:cxn modelId="{C93A21F4-3F9B-4B6A-BAC5-C248D0D34A7C}" srcId="{F6B61789-A162-4F46-AF7A-47222B3A3083}" destId="{65E67802-EB69-4DC3-9275-554C45FEF76F}" srcOrd="1" destOrd="0" parTransId="{AE65A81F-6411-4495-B7B7-1CFC767ECCAA}" sibTransId="{CCC67142-FF72-41C6-8FAA-CE2A583762EB}"/>
+    <dgm:cxn modelId="{4B1BE960-E4F8-42A5-B769-19B81E2D32A1}" type="presOf" srcId="{857F27A3-CD67-4C5D-B7BD-D66E5BE15C86}" destId="{D147A542-F6EA-4449-9A7D-E357B5E07485}" srcOrd="0" destOrd="0" presId="urn:microsoft.com/office/officeart/2005/8/layout/hierarchy4"/>
+    <dgm:cxn modelId="{649174C8-2526-4F1B-99A9-9074BA8DDA1C}" type="presOf" srcId="{F6B61789-A162-4F46-AF7A-47222B3A3083}" destId="{F4F797F7-0648-469A-85FC-CF81582105D5}" srcOrd="0" destOrd="0" presId="urn:microsoft.com/office/officeart/2005/8/layout/hierarchy4"/>
     <dgm:cxn modelId="{D605A80C-3E71-47B2-A83E-AE9FE81935B7}" type="presOf" srcId="{65E67802-EB69-4DC3-9275-554C45FEF76F}" destId="{57DD57F5-F579-483F-9DCF-B433E49EE277}" srcOrd="0" destOrd="0" presId="urn:microsoft.com/office/officeart/2005/8/layout/hierarchy4"/>
-    <dgm:cxn modelId="{9D5CDD4D-166E-461D-AB2C-CED63B69F234}" srcId="{C717C844-0A64-4C27-84CD-798B63D6257B}" destId="{68D38548-0C6D-4FC1-9BB9-DE83060CBA78}" srcOrd="0" destOrd="0" parTransId="{BB63F601-7ABC-4D88-BFD7-D98F189946EC}" sibTransId="{9767488C-C57B-45E7-A743-F351326F4032}"/>
-    <dgm:cxn modelId="{4B1BE960-E4F8-42A5-B769-19B81E2D32A1}" type="presOf" srcId="{857F27A3-CD67-4C5D-B7BD-D66E5BE15C86}" destId="{D147A542-F6EA-4449-9A7D-E357B5E07485}" srcOrd="0" destOrd="0" presId="urn:microsoft.com/office/officeart/2005/8/layout/hierarchy4"/>
-    <dgm:cxn modelId="{72AF1918-6D61-4E5C-A64C-BE575DEB7982}" type="presOf" srcId="{68D38548-0C6D-4FC1-9BB9-DE83060CBA78}" destId="{F42F8C64-EB35-4374-8818-6CF1B32BDC7F}" srcOrd="0" destOrd="0" presId="urn:microsoft.com/office/officeart/2005/8/layout/hierarchy4"/>
-    <dgm:cxn modelId="{FFC4B993-7072-4D0B-AECF-414981AA16BF}" srcId="{C8D12747-CD76-4D8A-A13C-336EBC174984}" destId="{857F27A3-CD67-4C5D-B7BD-D66E5BE15C86}" srcOrd="3" destOrd="0" parTransId="{DAAEA5EC-19AA-4D15-B1B5-4276EBEE89B0}" sibTransId="{3923C1F4-0671-4D20-B97C-7F1B9A57D278}"/>
-    <dgm:cxn modelId="{B5BDC00A-093B-4A85-A75D-5E0F2C0A0CEC}" srcId="{C8D12747-CD76-4D8A-A13C-336EBC174984}" destId="{31E84CBF-691E-49FA-AE0B-1712A8291958}" srcOrd="1" destOrd="0" parTransId="{AAEA2B16-94C1-4B9A-83D4-BFE34D0DF08C}" sibTransId="{0170B4C2-1A0F-41DA-A1D1-A4D73CE71B37}"/>
-    <dgm:cxn modelId="{DBB0F7B2-AD09-4CFB-8A02-CDD2BECBE23F}" srcId="{C8D12747-CD76-4D8A-A13C-336EBC174984}" destId="{690DA841-FBA0-43DA-BB36-61D80EBE630E}" srcOrd="2" destOrd="0" parTransId="{9A77E04C-878C-4948-A83A-06F447F1927B}" sibTransId="{A25E8313-7E98-407A-B752-B47AD14ECEB4}"/>
-    <dgm:cxn modelId="{5ECF2D7F-38AE-4A11-BF8E-8FA101F12A66}" srcId="{68D38548-0C6D-4FC1-9BB9-DE83060CBA78}" destId="{C8D12747-CD76-4D8A-A13C-336EBC174984}" srcOrd="1" destOrd="0" parTransId="{C8F4732A-B1A2-44CF-B0F2-CED3679438E0}" sibTransId="{F1BA292A-D898-4712-8741-3729222F5790}"/>
-    <dgm:cxn modelId="{1A29C05F-766A-4192-8C6B-6845F98B7193}" srcId="{C8D12747-CD76-4D8A-A13C-336EBC174984}" destId="{9BF4B013-4B03-4671-8444-B72B5EC5BC8B}" srcOrd="0" destOrd="0" parTransId="{3514E9FC-8505-4E1D-9C66-F627882849E6}" sibTransId="{F1282BCA-A7F7-4107-8385-061370B3DD81}"/>
     <dgm:cxn modelId="{42F1833F-A36B-4125-BFC1-23BFC0253358}" type="presParOf" srcId="{9273C5CD-C4A5-40C2-9F7E-F5C4BD228646}" destId="{EEA0BE2B-D300-45B3-B4A8-BA53299D4183}" srcOrd="0" destOrd="0" presId="urn:microsoft.com/office/officeart/2005/8/layout/hierarchy4"/>
     <dgm:cxn modelId="{263796D4-678B-4065-80C3-A6A35D9100C2}" type="presParOf" srcId="{EEA0BE2B-D300-45B3-B4A8-BA53299D4183}" destId="{F42F8C64-EB35-4374-8818-6CF1B32BDC7F}" srcOrd="0" destOrd="0" presId="urn:microsoft.com/office/officeart/2005/8/layout/hierarchy4"/>
     <dgm:cxn modelId="{A31811BC-3B4E-41A9-A259-87DEE301D4B1}" type="presParOf" srcId="{EEA0BE2B-D300-45B3-B4A8-BA53299D4183}" destId="{7322D62B-E4AA-4FEE-B87A-A76B91A0B46D}" srcOrd="1" destOrd="0" presId="urn:microsoft.com/office/officeart/2005/8/layout/hierarchy4"/>
@@ -11221,7 +11277,7 @@
         <p:spPr>
           <a:xfrm>
             <a:off x="3352800" y="2316494"/>
-            <a:ext cx="3886200" cy="400110"/>
+            <a:ext cx="3886200" cy="1323439"/>
           </a:xfrm>
           <a:prstGeom prst="rect">
             <a:avLst/>
@@ -11239,12 +11295,51 @@
               <a:buChar char="•"/>
             </a:pPr>
             <a:r>
-              <a:rPr lang="en-US" sz="2000" smtClean="0">
-                <a:latin typeface="Calibri" pitchFamily="34" charset="0"/>
-                <a:cs typeface="Calibri" pitchFamily="34" charset="0"/>
-              </a:rPr>
-              <a:t>Introduction to Hypothesis</a:t>
-            </a:r>
+              <a:rPr lang="en-US" sz="2000" dirty="0" smtClean="0">
+                <a:latin typeface="Calibri" pitchFamily="34" charset="0"/>
+                <a:cs typeface="Calibri" pitchFamily="34" charset="0"/>
+              </a:rPr>
+              <a:t>Introduction to </a:t>
+            </a:r>
+            <a:r>
+              <a:rPr lang="en-US" sz="2000" dirty="0" smtClean="0">
+                <a:latin typeface="Calibri" pitchFamily="34" charset="0"/>
+                <a:cs typeface="Calibri" pitchFamily="34" charset="0"/>
+              </a:rPr>
+              <a:t>Hypothesis</a:t>
+            </a:r>
+          </a:p>
+          <a:p>
+            <a:pPr marL="342900" indent="-342900">
+              <a:buFont typeface="Arial" pitchFamily="34" charset="0"/>
+              <a:buChar char="•"/>
+            </a:pPr>
+            <a:r>
+              <a:rPr lang="en-US" sz="2000" dirty="0" smtClean="0">
+                <a:latin typeface="Calibri" pitchFamily="34" charset="0"/>
+                <a:cs typeface="Calibri" pitchFamily="34" charset="0"/>
+              </a:rPr>
+              <a:t>Type I and Type II Errors</a:t>
+            </a:r>
+          </a:p>
+          <a:p>
+            <a:pPr marL="342900" indent="-342900">
+              <a:buFont typeface="Arial" pitchFamily="34" charset="0"/>
+              <a:buChar char="•"/>
+            </a:pPr>
+            <a:r>
+              <a:rPr lang="en-US" sz="2000" dirty="0" smtClean="0">
+                <a:latin typeface="Calibri" pitchFamily="34" charset="0"/>
+                <a:cs typeface="Calibri" pitchFamily="34" charset="0"/>
+              </a:rPr>
+              <a:t>Test of Hypothesis</a:t>
+            </a:r>
+          </a:p>
+          <a:p>
+            <a:pPr marL="342900" indent="-342900">
+              <a:buFont typeface="Arial" pitchFamily="34" charset="0"/>
+              <a:buChar char="•"/>
+            </a:pPr>
             <a:endParaRPr lang="en-US" sz="2000" dirty="0" smtClean="0">
               <a:latin typeface="Calibri" pitchFamily="34" charset="0"/>
               <a:cs typeface="Calibri" pitchFamily="34" charset="0"/>
@@ -12718,10 +12813,6 @@
               </a:rPr>
               <a:t>Visualizing Type I and Type II Errors</a:t>
             </a:r>
-            <a:endParaRPr lang="en-US" sz="3600" dirty="0">
-              <a:latin typeface="Calibri" pitchFamily="34" charset="0"/>
-              <a:cs typeface="Calibri" pitchFamily="34" charset="0"/>
-            </a:endParaRPr>
           </a:p>
         </p:txBody>
       </p:sp>
@@ -12755,10 +12846,6 @@
               </a:rPr>
               <a:t>Case:</a:t>
             </a:r>
-            <a:endParaRPr lang="en-US" sz="2000" b="1" dirty="0" smtClean="0">
-              <a:latin typeface="Calibri" pitchFamily="34" charset="0"/>
-              <a:cs typeface="Calibri" pitchFamily="34" charset="0"/>
-            </a:endParaRPr>
           </a:p>
           <a:p>
             <a:pPr algn="just"/>
@@ -13022,10 +13109,6 @@
               </a:rPr>
               <a:t>Visualizing Type I and Type II Errors</a:t>
             </a:r>
-            <a:endParaRPr lang="en-US" sz="3600" dirty="0">
-              <a:latin typeface="Calibri" pitchFamily="34" charset="0"/>
-              <a:cs typeface="Calibri" pitchFamily="34" charset="0"/>
-            </a:endParaRPr>
           </a:p>
         </p:txBody>
       </p:sp>
@@ -13157,10 +13240,6 @@
               </a:rPr>
               <a:t>Visualizing Type I and Type II Errors</a:t>
             </a:r>
-            <a:endParaRPr lang="en-US" sz="3600" dirty="0">
-              <a:latin typeface="Calibri" pitchFamily="34" charset="0"/>
-              <a:cs typeface="Calibri" pitchFamily="34" charset="0"/>
-            </a:endParaRPr>
           </a:p>
         </p:txBody>
       </p:sp>
@@ -13367,10 +13446,6 @@
               </a:rPr>
               <a:t>Two Tailed Test Rejection</a:t>
             </a:r>
-            <a:endParaRPr lang="en-US" sz="3600" dirty="0">
-              <a:latin typeface="Calibri" pitchFamily="34" charset="0"/>
-              <a:cs typeface="Calibri" pitchFamily="34" charset="0"/>
-            </a:endParaRPr>
           </a:p>
         </p:txBody>
       </p:sp>
@@ -13780,10 +13855,6 @@
               </a:rPr>
               <a:t>Large Sample Test</a:t>
             </a:r>
-            <a:endParaRPr lang="en-US" sz="2000" b="1" dirty="0" smtClean="0">
-              <a:latin typeface="Calibri" pitchFamily="34" charset="0"/>
-              <a:cs typeface="Calibri" pitchFamily="34" charset="0"/>
-            </a:endParaRPr>
           </a:p>
           <a:p>
             <a:pPr marL="342900" indent="-342900" algn="just">
@@ -13930,10 +14001,6 @@
               </a:rPr>
               <a:t>Small Sample Test</a:t>
             </a:r>
-            <a:endParaRPr lang="en-US" sz="2000" b="1" dirty="0" smtClean="0">
-              <a:latin typeface="Calibri" pitchFamily="34" charset="0"/>
-              <a:cs typeface="Calibri" pitchFamily="34" charset="0"/>
-            </a:endParaRPr>
           </a:p>
           <a:p>
             <a:pPr marL="342900" indent="-342900" algn="just">
@@ -14066,10 +14133,6 @@
               </a:rPr>
               <a:t>over all the possible sample drawn from a population (finite or infinite).</a:t>
             </a:r>
-            <a:endParaRPr lang="en-US" sz="1600" dirty="0">
-              <a:latin typeface="Calibri" pitchFamily="34" charset="0"/>
-              <a:cs typeface="Calibri" pitchFamily="34" charset="0"/>
-            </a:endParaRPr>
           </a:p>
         </p:txBody>
       </p:sp>
@@ -14312,10 +14375,6 @@
               </a:rPr>
               <a:t>How to calculate statistics: </a:t>
             </a:r>
-            <a:endParaRPr lang="en-US" sz="2000" dirty="0" smtClean="0">
-              <a:latin typeface="Calibri" pitchFamily="34" charset="0"/>
-              <a:cs typeface="Calibri" pitchFamily="34" charset="0"/>
-            </a:endParaRPr>
           </a:p>
           <a:p>
             <a:pPr algn="just"/>
@@ -14907,10 +14966,6 @@
               </a:rPr>
               <a:t>How to calculate statistics: </a:t>
             </a:r>
-            <a:endParaRPr lang="en-US" sz="2000" dirty="0" smtClean="0">
-              <a:latin typeface="Calibri" pitchFamily="34" charset="0"/>
-              <a:cs typeface="Calibri" pitchFamily="34" charset="0"/>
-            </a:endParaRPr>
           </a:p>
           <a:p>
             <a:pPr algn="just"/>

</xml_diff>